<commit_message>
Master Seminar: updated presentation
</commit_message>
<xml_diff>
--- a/master-seminar/presentation.pptx
+++ b/master-seminar/presentation.pptx
@@ -350,7 +350,7 @@
         </pc:spChg>
         <pc:extLst>
           <p:ext xmlns:p="http://schemas.openxmlformats.org/presentationml/2006/main" uri="{D6D511B9-2390-475A-947B-AFAB55BFBCF1}">
-            <pc226:cmChg xmlns:pc226="http://schemas.microsoft.com/office/powerpoint/2022/06/main/command" chg="add">
+            <pc226:cmChg xmlns:pc226="http://schemas.microsoft.com/office/powerpoint/2022/06/main/command" xmlns="" chg="add">
               <pc226:chgData name="Viktoriia Abakumova" userId="S::abakumov@ut.ee::eb6e6118-4c59-4af1-bbe4-062681023ed9" providerId="AD" clId="Web-{55E0634A-6E7B-2F10-D6F9-1888EA0692D5}" dt="2023-03-14T21:37:05.779" v="8"/>
               <pc2:cmMkLst xmlns:pc2="http://schemas.microsoft.com/office/powerpoint/2019/9/main/command">
                 <pc:docMk/>
@@ -369,7 +369,7 @@
         </pc:sldMkLst>
         <pc:extLst>
           <p:ext xmlns:p="http://schemas.openxmlformats.org/presentationml/2006/main" uri="{D6D511B9-2390-475A-947B-AFAB55BFBCF1}">
-            <pc226:cmChg xmlns:pc226="http://schemas.microsoft.com/office/powerpoint/2022/06/main/command" chg="add">
+            <pc226:cmChg xmlns:pc226="http://schemas.microsoft.com/office/powerpoint/2022/06/main/command" xmlns="" chg="add">
               <pc226:chgData name="Viktoriia Abakumova" userId="S::abakumov@ut.ee::eb6e6118-4c59-4af1-bbe4-062681023ed9" providerId="AD" clId="Web-{55E0634A-6E7B-2F10-D6F9-1888EA0692D5}" dt="2023-03-14T21:21:53.066" v="4"/>
               <pc2:cmMkLst xmlns:pc2="http://schemas.microsoft.com/office/powerpoint/2019/9/main/command">
                 <pc:docMk/>
@@ -979,7 +979,7 @@
         </pc:spChg>
         <pc:extLst>
           <p:ext xmlns:p="http://schemas.openxmlformats.org/presentationml/2006/main" uri="{D6D511B9-2390-475A-947B-AFAB55BFBCF1}">
-            <pc226:cmChg xmlns:pc226="http://schemas.microsoft.com/office/powerpoint/2022/06/main/command" chg="">
+            <pc226:cmChg xmlns:pc226="http://schemas.microsoft.com/office/powerpoint/2022/06/main/command" xmlns="" chg="">
               <pc226:chgData name="Serhii Murashko" userId="S::murashko@ut.ee::fa439e6b-9426-4fda-8ca9-28f00dfd2276" providerId="AD" clId="Web-{8F415F65-91D2-E9E5-413D-F0D7B1E6E4E9}" dt="2023-03-14T21:49:36.870" v="15"/>
               <pc2:cmMkLst xmlns:pc2="http://schemas.microsoft.com/office/powerpoint/2019/9/main/command">
                 <pc:docMk/>
@@ -3362,30 +3362,6 @@
     </pc:docChg>
   </pc:docChgLst>
   <pc:docChgLst>
-    <pc:chgData name="Viktoriia Abakumova" userId="S::abakumov@ut.ee::eb6e6118-4c59-4af1-bbe4-062681023ed9" providerId="AD" clId="Web-{69C9D03E-EF88-16D1-39BA-325E2D3E40D2}"/>
-    <pc:docChg chg="modSld">
-      <pc:chgData name="Viktoriia Abakumova" userId="S::abakumov@ut.ee::eb6e6118-4c59-4af1-bbe4-062681023ed9" providerId="AD" clId="Web-{69C9D03E-EF88-16D1-39BA-325E2D3E40D2}" dt="2023-03-25T15:20:27.004" v="0"/>
-      <pc:docMkLst>
-        <pc:docMk/>
-      </pc:docMkLst>
-      <pc:sldChg chg="delSp">
-        <pc:chgData name="Viktoriia Abakumova" userId="S::abakumov@ut.ee::eb6e6118-4c59-4af1-bbe4-062681023ed9" providerId="AD" clId="Web-{69C9D03E-EF88-16D1-39BA-325E2D3E40D2}" dt="2023-03-25T15:20:27.004" v="0"/>
-        <pc:sldMkLst>
-          <pc:docMk/>
-          <pc:sldMk cId="761428422" sldId="292"/>
-        </pc:sldMkLst>
-        <pc:spChg chg="del">
-          <ac:chgData name="Viktoriia Abakumova" userId="S::abakumov@ut.ee::eb6e6118-4c59-4af1-bbe4-062681023ed9" providerId="AD" clId="Web-{69C9D03E-EF88-16D1-39BA-325E2D3E40D2}" dt="2023-03-25T15:20:27.004" v="0"/>
-          <ac:spMkLst>
-            <pc:docMk/>
-            <pc:sldMk cId="761428422" sldId="292"/>
-            <ac:spMk id="3" creationId="{558DB187-3864-5C06-2370-2AE63FA65C75}"/>
-          </ac:spMkLst>
-        </pc:spChg>
-      </pc:sldChg>
-    </pc:docChg>
-  </pc:docChgLst>
-  <pc:docChgLst>
     <pc:chgData name="Serhii Murashko" userId="S::murashko@ut.ee::fa439e6b-9426-4fda-8ca9-28f00dfd2276" providerId="AD" clId="Web-{53E9E791-B6B6-4224-281F-B36F33B6585F}"/>
     <pc:docChg chg="addSld delSld modSld">
       <pc:chgData name="Serhii Murashko" userId="S::murashko@ut.ee::fa439e6b-9426-4fda-8ca9-28f00dfd2276" providerId="AD" clId="Web-{53E9E791-B6B6-4224-281F-B36F33B6585F}" dt="2023-03-25T12:44:12.795" v="206"/>
@@ -3626,6 +3602,30 @@
             <pc:docMk/>
             <pc:sldMk cId="761428422" sldId="292"/>
             <ac:spMk id="2" creationId="{43B605D0-3856-EB28-163D-B197C9EDB0A3}"/>
+          </ac:spMkLst>
+        </pc:spChg>
+      </pc:sldChg>
+    </pc:docChg>
+  </pc:docChgLst>
+  <pc:docChgLst>
+    <pc:chgData name="Viktoriia Abakumova" userId="S::abakumov@ut.ee::eb6e6118-4c59-4af1-bbe4-062681023ed9" providerId="AD" clId="Web-{69C9D03E-EF88-16D1-39BA-325E2D3E40D2}"/>
+    <pc:docChg chg="modSld">
+      <pc:chgData name="Viktoriia Abakumova" userId="S::abakumov@ut.ee::eb6e6118-4c59-4af1-bbe4-062681023ed9" providerId="AD" clId="Web-{69C9D03E-EF88-16D1-39BA-325E2D3E40D2}" dt="2023-03-25T15:20:27.004" v="0"/>
+      <pc:docMkLst>
+        <pc:docMk/>
+      </pc:docMkLst>
+      <pc:sldChg chg="delSp">
+        <pc:chgData name="Viktoriia Abakumova" userId="S::abakumov@ut.ee::eb6e6118-4c59-4af1-bbe4-062681023ed9" providerId="AD" clId="Web-{69C9D03E-EF88-16D1-39BA-325E2D3E40D2}" dt="2023-03-25T15:20:27.004" v="0"/>
+        <pc:sldMkLst>
+          <pc:docMk/>
+          <pc:sldMk cId="761428422" sldId="292"/>
+        </pc:sldMkLst>
+        <pc:spChg chg="del">
+          <ac:chgData name="Viktoriia Abakumova" userId="S::abakumov@ut.ee::eb6e6118-4c59-4af1-bbe4-062681023ed9" providerId="AD" clId="Web-{69C9D03E-EF88-16D1-39BA-325E2D3E40D2}" dt="2023-03-25T15:20:27.004" v="0"/>
+          <ac:spMkLst>
+            <pc:docMk/>
+            <pc:sldMk cId="761428422" sldId="292"/>
+            <ac:spMk id="3" creationId="{558DB187-3864-5C06-2370-2AE63FA65C75}"/>
           </ac:spMkLst>
         </pc:spChg>
       </pc:sldChg>
@@ -6336,7 +6336,7 @@
           <a:p>
             <a:fld id="{C485584D-7D79-4248-9986-4CA35242F944}" type="datetimeFigureOut">
               <a:rPr lang="en-US" smtClean="0"/>
-              <a:t>3/26/2023</a:t>
+              <a:t>3/29/2023</a:t>
             </a:fld>
             <a:endParaRPr lang="en-US"/>
           </a:p>
@@ -6710,7 +6710,7 @@
           <a:p>
             <a:fld id="{C485584D-7D79-4248-9986-4CA35242F944}" type="datetimeFigureOut">
               <a:rPr lang="en-US" smtClean="0"/>
-              <a:t>3/26/2023</a:t>
+              <a:t>3/29/2023</a:t>
             </a:fld>
             <a:endParaRPr lang="en-US"/>
           </a:p>
@@ -6918,7 +6918,7 @@
           <a:p>
             <a:fld id="{C485584D-7D79-4248-9986-4CA35242F944}" type="datetimeFigureOut">
               <a:rPr lang="en-US" smtClean="0"/>
-              <a:t>3/26/2023</a:t>
+              <a:t>3/29/2023</a:t>
             </a:fld>
             <a:endParaRPr lang="en-US"/>
           </a:p>
@@ -7116,7 +7116,7 @@
           <a:p>
             <a:fld id="{C485584D-7D79-4248-9986-4CA35242F944}" type="datetimeFigureOut">
               <a:rPr lang="en-US" smtClean="0"/>
-              <a:t>3/26/2023</a:t>
+              <a:t>3/29/2023</a:t>
             </a:fld>
             <a:endParaRPr lang="en-US"/>
           </a:p>
@@ -7229,7 +7229,7 @@
           <a:p>
             <a:fld id="{C485584D-7D79-4248-9986-4CA35242F944}" type="datetimeFigureOut">
               <a:rPr lang="en-US" smtClean="0"/>
-              <a:t>3/26/2023</a:t>
+              <a:t>3/29/2023</a:t>
             </a:fld>
             <a:endParaRPr lang="en-US"/>
           </a:p>
@@ -7965,7 +7965,7 @@
           <a:p>
             <a:fld id="{C485584D-7D79-4248-9986-4CA35242F944}" type="datetimeFigureOut">
               <a:rPr lang="en-US" smtClean="0"/>
-              <a:t>3/26/2023</a:t>
+              <a:t>3/29/2023</a:t>
             </a:fld>
             <a:endParaRPr lang="en-US"/>
           </a:p>
@@ -8381,7 +8381,7 @@
           <a:p>
             <a:fld id="{C485584D-7D79-4248-9986-4CA35242F944}" type="datetimeFigureOut">
               <a:rPr lang="en-US" smtClean="0"/>
-              <a:t>3/26/2023</a:t>
+              <a:t>3/29/2023</a:t>
             </a:fld>
             <a:endParaRPr lang="en-US"/>
           </a:p>
@@ -8522,7 +8522,7 @@
           <a:p>
             <a:fld id="{C485584D-7D79-4248-9986-4CA35242F944}" type="datetimeFigureOut">
               <a:rPr lang="en-US" smtClean="0"/>
-              <a:t>3/26/2023</a:t>
+              <a:t>3/29/2023</a:t>
             </a:fld>
             <a:endParaRPr lang="en-US"/>
           </a:p>
@@ -8635,7 +8635,7 @@
           <a:p>
             <a:fld id="{C485584D-7D79-4248-9986-4CA35242F944}" type="datetimeFigureOut">
               <a:rPr lang="en-US" smtClean="0"/>
-              <a:t>3/26/2023</a:t>
+              <a:t>3/29/2023</a:t>
             </a:fld>
             <a:endParaRPr lang="en-US"/>
           </a:p>
@@ -8946,7 +8946,7 @@
           <a:p>
             <a:fld id="{C485584D-7D79-4248-9986-4CA35242F944}" type="datetimeFigureOut">
               <a:rPr lang="en-US" smtClean="0"/>
-              <a:t>3/26/2023</a:t>
+              <a:t>3/29/2023</a:t>
             </a:fld>
             <a:endParaRPr lang="en-US"/>
           </a:p>
@@ -9237,7 +9237,7 @@
           <a:p>
             <a:fld id="{C485584D-7D79-4248-9986-4CA35242F944}" type="datetimeFigureOut">
               <a:rPr lang="en-US" smtClean="0"/>
-              <a:t>3/26/2023</a:t>
+              <a:t>3/29/2023</a:t>
             </a:fld>
             <a:endParaRPr lang="en-US"/>
           </a:p>
@@ -9521,7 +9521,7 @@
           <a:p>
             <a:fld id="{C485584D-7D79-4248-9986-4CA35242F944}" type="datetimeFigureOut">
               <a:rPr lang="en-US" smtClean="0"/>
-              <a:t>3/26/2023</a:t>
+              <a:t>3/29/2023</a:t>
             </a:fld>
             <a:endParaRPr lang="en-US"/>
           </a:p>
@@ -13178,18 +13178,18 @@
               </a:lnSpc>
             </a:pPr>
             <a:r>
-              <a:rPr lang="en-US" b="1">
+              <a:rPr lang="en-US" b="1" dirty="0">
                 <a:ea typeface="+mn-lt"/>
                 <a:cs typeface="+mn-lt"/>
               </a:rPr>
               <a:t>The aim </a:t>
             </a:r>
             <a:r>
-              <a:rPr lang="en-US">
+              <a:rPr lang="en-US" dirty="0">
                 <a:ea typeface="+mn-lt"/>
                 <a:cs typeface="+mn-lt"/>
               </a:rPr>
-              <a:t>- to give an overview of location-based services, fields where these services are used, current location-tracking technologies and possible improvements. </a:t>
+              <a:t>- to give an overview of different code smell types, tools and techniques that are used for identifying and preventing. </a:t>
             </a:r>
           </a:p>
           <a:p>
@@ -13199,7 +13199,7 @@
               </a:lnSpc>
             </a:pPr>
             <a:r>
-              <a:rPr lang="en-US">
+              <a:rPr lang="en-US" dirty="0">
                 <a:ea typeface="+mn-lt"/>
                 <a:cs typeface="+mn-lt"/>
               </a:rPr>
@@ -13213,7 +13213,7 @@
               </a:lnSpc>
             </a:pPr>
             <a:r>
-              <a:rPr lang="en-US">
+              <a:rPr lang="en-US" dirty="0">
                 <a:ea typeface="+mn-lt"/>
                 <a:cs typeface="+mn-lt"/>
               </a:rPr>
@@ -13227,7 +13227,7 @@
               </a:lnSpc>
             </a:pPr>
             <a:r>
-              <a:rPr lang="en-US">
+              <a:rPr lang="en-US" dirty="0">
                 <a:ea typeface="+mn-lt"/>
                 <a:cs typeface="+mn-lt"/>
               </a:rPr>
@@ -13241,7 +13241,7 @@
               </a:lnSpc>
             </a:pPr>
             <a:r>
-              <a:rPr lang="en-US">
+              <a:rPr lang="en-US" dirty="0">
                 <a:ea typeface="+mn-lt"/>
                 <a:cs typeface="+mn-lt"/>
               </a:rPr>
@@ -13255,13 +13255,13 @@
               </a:lnSpc>
             </a:pPr>
             <a:r>
-              <a:rPr lang="en-US">
+              <a:rPr lang="en-US" dirty="0">
                 <a:ea typeface="+mn-lt"/>
                 <a:cs typeface="+mn-lt"/>
               </a:rPr>
               <a:t>• Results</a:t>
             </a:r>
-            <a:endParaRPr lang="en-US"/>
+            <a:endParaRPr lang="en-US" dirty="0"/>
           </a:p>
         </p:txBody>
       </p:sp>

</xml_diff>